<commit_message>
Fix Edit ArgumentParser Suggestion  Activity Diagram
</commit_message>
<xml_diff>
--- a/docs/diagrams/SuggestionEditActivityDiagram.pptx
+++ b/docs/diagrams/SuggestionEditActivityDiagram.pptx
@@ -3594,11 +3594,7 @@
             <a:pPr algn="ctr"/>
             <a:r>
               <a:rPr lang="en-SG" sz="1801" dirty="0" smtClean="0"/>
-              <a:t>Check remaining for </a:t>
-            </a:r>
-            <a:r>
-              <a:rPr lang="en-SG" sz="1801" dirty="0" smtClean="0"/>
-              <a:t>phone</a:t>
+              <a:t>Check remaining for phone</a:t>
             </a:r>
             <a:endParaRPr lang="en-SG" sz="1801" dirty="0"/>
           </a:p>
@@ -3826,7 +3822,7 @@
         </p:nvGrpSpPr>
         <p:grpSpPr>
           <a:xfrm>
-            <a:off x="13946428" y="5754994"/>
+            <a:off x="13946428" y="7085218"/>
             <a:ext cx="235669" cy="235669"/>
             <a:chOff x="8040730" y="5082186"/>
             <a:chExt cx="235669" cy="235669"/>
@@ -4502,11 +4498,7 @@
             <a:pPr algn="ctr"/>
             <a:r>
               <a:rPr lang="en-SG" sz="1801" dirty="0" smtClean="0"/>
-              <a:t>Check remaining for </a:t>
-            </a:r>
-            <a:r>
-              <a:rPr lang="en-SG" sz="1801" dirty="0" smtClean="0"/>
-              <a:t>email</a:t>
+              <a:t>Check remaining for email</a:t>
             </a:r>
             <a:endParaRPr lang="en-SG" sz="1801" dirty="0"/>
           </a:p>
@@ -4892,7 +4884,7 @@
         <p:spPr>
           <a:xfrm>
             <a:off x="12778728" y="-22638385"/>
-            <a:ext cx="1285535" cy="28393379"/>
+            <a:ext cx="1285535" cy="29723603"/>
           </a:xfrm>
           <a:prstGeom prst="bentConnector2">
             <a:avLst/>
@@ -6505,11 +6497,7 @@
             <a:pPr algn="ctr"/>
             <a:r>
               <a:rPr lang="en-SG" sz="1801" dirty="0" smtClean="0"/>
-              <a:t>Check remaining for </a:t>
-            </a:r>
-            <a:r>
-              <a:rPr lang="en-SG" sz="1801" dirty="0" smtClean="0"/>
-              <a:t>address</a:t>
+              <a:t>Check remaining for address</a:t>
             </a:r>
             <a:endParaRPr lang="en-SG" sz="1801" dirty="0"/>
           </a:p>
@@ -6961,11 +6949,7 @@
             <a:pPr algn="ctr"/>
             <a:r>
               <a:rPr lang="en-SG" sz="1801" dirty="0" smtClean="0"/>
-              <a:t>Check remaining for </a:t>
-            </a:r>
-            <a:r>
-              <a:rPr lang="en-SG" sz="1801" dirty="0" smtClean="0"/>
-              <a:t>name</a:t>
+              <a:t>Check remaining for name</a:t>
             </a:r>
             <a:endParaRPr lang="en-SG" sz="1801" dirty="0"/>
           </a:p>
@@ -7834,7 +7818,7 @@
         <p:spPr>
           <a:xfrm>
             <a:off x="6102496" y="4614567"/>
-            <a:ext cx="7961767" cy="1140427"/>
+            <a:ext cx="7961767" cy="2470651"/>
           </a:xfrm>
           <a:prstGeom prst="bentConnector2">
             <a:avLst/>
@@ -8026,19 +8010,19 @@
           <p:cNvPr id="323" name="Elbow Connector 322"/>
           <p:cNvCxnSpPr>
             <a:stCxn id="102" idx="3"/>
-            <a:endCxn id="276" idx="0"/>
+            <a:endCxn id="120" idx="0"/>
           </p:cNvCxnSpPr>
           <p:nvPr/>
         </p:nvCxnSpPr>
         <p:spPr>
           <a:xfrm flipV="1">
-            <a:off x="7885937" y="-23715801"/>
-            <a:ext cx="3262380" cy="1456653"/>
+            <a:off x="7885937" y="-24081615"/>
+            <a:ext cx="3262380" cy="1822467"/>
           </a:xfrm>
           <a:prstGeom prst="bentConnector4">
             <a:avLst>
-              <a:gd name="adj1" fmla="val 44282"/>
-              <a:gd name="adj2" fmla="val 115694"/>
+              <a:gd name="adj1" fmla="val 47050"/>
+              <a:gd name="adj2" fmla="val 112543"/>
             </a:avLst>
           </a:prstGeom>
           <a:ln>
@@ -8210,6 +8194,118 @@
           </a:xfrm>
           <a:prstGeom prst="straightConnector1">
             <a:avLst/>
+          </a:prstGeom>
+          <a:ln>
+            <a:tailEnd type="triangle"/>
+          </a:ln>
+        </p:spPr>
+        <p:style>
+          <a:lnRef idx="1">
+            <a:schemeClr val="dk1"/>
+          </a:lnRef>
+          <a:fillRef idx="0">
+            <a:schemeClr val="dk1"/>
+          </a:fillRef>
+          <a:effectRef idx="0">
+            <a:schemeClr val="dk1"/>
+          </a:effectRef>
+          <a:fontRef idx="minor">
+            <a:schemeClr val="tx1"/>
+          </a:fontRef>
+        </p:style>
+      </p:cxnSp>
+      <p:sp>
+        <p:nvSpPr>
+          <p:cNvPr id="120" name="Rectangle 119"/>
+          <p:cNvSpPr/>
+          <p:nvPr/>
+        </p:nvSpPr>
+        <p:spPr>
+          <a:xfrm>
+            <a:off x="10955812" y="-24081615"/>
+            <a:ext cx="385010" cy="361220"/>
+          </a:xfrm>
+          <a:prstGeom prst="rect">
+            <a:avLst/>
+          </a:prstGeom>
+        </p:spPr>
+        <p:style>
+          <a:lnRef idx="1">
+            <a:schemeClr val="dk1"/>
+          </a:lnRef>
+          <a:fillRef idx="2">
+            <a:schemeClr val="dk1"/>
+          </a:fillRef>
+          <a:effectRef idx="1">
+            <a:schemeClr val="dk1"/>
+          </a:effectRef>
+          <a:fontRef idx="minor">
+            <a:schemeClr val="dk1"/>
+          </a:fontRef>
+        </p:style>
+        <p:txBody>
+          <a:bodyPr rtlCol="0" anchor="ctr"/>
+          <a:lstStyle/>
+          <a:p>
+            <a:pPr algn="ctr"/>
+            <a:endParaRPr lang="en-GB"/>
+          </a:p>
+        </p:txBody>
+      </p:sp>
+      <p:sp>
+        <p:nvSpPr>
+          <p:cNvPr id="123" name="TextBox 122">
+            <a:extLst>
+              <a:ext uri="{FF2B5EF4-FFF2-40B4-BE49-F238E27FC236}">
+                <a16:creationId xmlns:a16="http://schemas.microsoft.com/office/drawing/2014/main" id="{3ABD3846-DF71-49C4-AE22-6CE1C8B39149}"/>
+              </a:ext>
+            </a:extLst>
+          </p:cNvPr>
+          <p:cNvSpPr txBox="1"/>
+          <p:nvPr/>
+        </p:nvSpPr>
+        <p:spPr>
+          <a:xfrm>
+            <a:off x="11323850" y="-24081615"/>
+            <a:ext cx="1717288" cy="369460"/>
+          </a:xfrm>
+          <a:prstGeom prst="rect">
+            <a:avLst/>
+          </a:prstGeom>
+          <a:noFill/>
+        </p:spPr>
+        <p:txBody>
+          <a:bodyPr wrap="square" rtlCol="0">
+            <a:spAutoFit/>
+          </a:bodyPr>
+          <a:lstStyle/>
+          <a:p>
+            <a:r>
+              <a:rPr lang="en-SG" sz="1801" dirty="0" err="1" smtClean="0"/>
+              <a:t>commandWord</a:t>
+            </a:r>
+            <a:endParaRPr lang="en-SG" sz="1801" dirty="0"/>
+          </a:p>
+        </p:txBody>
+      </p:sp>
+      <p:cxnSp>
+        <p:nvCxnSpPr>
+          <p:cNvPr id="125" name="Elbow Connector 124"/>
+          <p:cNvCxnSpPr>
+            <a:stCxn id="4" idx="4"/>
+            <a:endCxn id="120" idx="0"/>
+          </p:cNvCxnSpPr>
+          <p:nvPr/>
+        </p:nvCxnSpPr>
+        <p:spPr>
+          <a:xfrm rot="16200000" flipH="1">
+            <a:off x="7751894" y="-27478038"/>
+            <a:ext cx="1557706" cy="5235140"/>
+          </a:xfrm>
+          <a:prstGeom prst="bentConnector3">
+            <a:avLst>
+              <a:gd name="adj1" fmla="val 7604"/>
+            </a:avLst>
           </a:prstGeom>
           <a:ln>
             <a:tailEnd type="triangle"/>

</xml_diff>

<commit_message>
Fix missed remaining label
</commit_message>
<xml_diff>
--- a/docs/diagrams/SuggestionEditActivityDiagram.pptx
+++ b/docs/diagrams/SuggestionEditActivityDiagram.pptx
@@ -265,7 +265,7 @@
           <a:p>
             <a:fld id="{542F47FF-5056-41FF-A1F8-23A414798AA4}" type="datetimeFigureOut">
               <a:rPr lang="en-SG" smtClean="0"/>
-              <a:t>12/11/2017</a:t>
+              <a:t>13/11/2017</a:t>
             </a:fld>
             <a:endParaRPr lang="en-SG"/>
           </a:p>
@@ -465,7 +465,7 @@
           <a:p>
             <a:fld id="{542F47FF-5056-41FF-A1F8-23A414798AA4}" type="datetimeFigureOut">
               <a:rPr lang="en-SG" smtClean="0"/>
-              <a:t>12/11/2017</a:t>
+              <a:t>13/11/2017</a:t>
             </a:fld>
             <a:endParaRPr lang="en-SG"/>
           </a:p>
@@ -675,7 +675,7 @@
           <a:p>
             <a:fld id="{542F47FF-5056-41FF-A1F8-23A414798AA4}" type="datetimeFigureOut">
               <a:rPr lang="en-SG" smtClean="0"/>
-              <a:t>12/11/2017</a:t>
+              <a:t>13/11/2017</a:t>
             </a:fld>
             <a:endParaRPr lang="en-SG"/>
           </a:p>
@@ -875,7 +875,7 @@
           <a:p>
             <a:fld id="{542F47FF-5056-41FF-A1F8-23A414798AA4}" type="datetimeFigureOut">
               <a:rPr lang="en-SG" smtClean="0"/>
-              <a:t>12/11/2017</a:t>
+              <a:t>13/11/2017</a:t>
             </a:fld>
             <a:endParaRPr lang="en-SG"/>
           </a:p>
@@ -1151,7 +1151,7 @@
           <a:p>
             <a:fld id="{542F47FF-5056-41FF-A1F8-23A414798AA4}" type="datetimeFigureOut">
               <a:rPr lang="en-SG" smtClean="0"/>
-              <a:t>12/11/2017</a:t>
+              <a:t>13/11/2017</a:t>
             </a:fld>
             <a:endParaRPr lang="en-SG"/>
           </a:p>
@@ -1419,7 +1419,7 @@
           <a:p>
             <a:fld id="{542F47FF-5056-41FF-A1F8-23A414798AA4}" type="datetimeFigureOut">
               <a:rPr lang="en-SG" smtClean="0"/>
-              <a:t>12/11/2017</a:t>
+              <a:t>13/11/2017</a:t>
             </a:fld>
             <a:endParaRPr lang="en-SG"/>
           </a:p>
@@ -1834,7 +1834,7 @@
           <a:p>
             <a:fld id="{542F47FF-5056-41FF-A1F8-23A414798AA4}" type="datetimeFigureOut">
               <a:rPr lang="en-SG" smtClean="0"/>
-              <a:t>12/11/2017</a:t>
+              <a:t>13/11/2017</a:t>
             </a:fld>
             <a:endParaRPr lang="en-SG"/>
           </a:p>
@@ -1976,7 +1976,7 @@
           <a:p>
             <a:fld id="{542F47FF-5056-41FF-A1F8-23A414798AA4}" type="datetimeFigureOut">
               <a:rPr lang="en-SG" smtClean="0"/>
-              <a:t>12/11/2017</a:t>
+              <a:t>13/11/2017</a:t>
             </a:fld>
             <a:endParaRPr lang="en-SG"/>
           </a:p>
@@ -2089,7 +2089,7 @@
           <a:p>
             <a:fld id="{542F47FF-5056-41FF-A1F8-23A414798AA4}" type="datetimeFigureOut">
               <a:rPr lang="en-SG" smtClean="0"/>
-              <a:t>12/11/2017</a:t>
+              <a:t>13/11/2017</a:t>
             </a:fld>
             <a:endParaRPr lang="en-SG"/>
           </a:p>
@@ -2402,7 +2402,7 @@
           <a:p>
             <a:fld id="{542F47FF-5056-41FF-A1F8-23A414798AA4}" type="datetimeFigureOut">
               <a:rPr lang="en-SG" smtClean="0"/>
-              <a:t>12/11/2017</a:t>
+              <a:t>13/11/2017</a:t>
             </a:fld>
             <a:endParaRPr lang="en-SG"/>
           </a:p>
@@ -2691,7 +2691,7 @@
           <a:p>
             <a:fld id="{542F47FF-5056-41FF-A1F8-23A414798AA4}" type="datetimeFigureOut">
               <a:rPr lang="en-SG" smtClean="0"/>
-              <a:t>12/11/2017</a:t>
+              <a:t>13/11/2017</a:t>
             </a:fld>
             <a:endParaRPr lang="en-SG"/>
           </a:p>
@@ -2934,7 +2934,7 @@
           <a:p>
             <a:fld id="{542F47FF-5056-41FF-A1F8-23A414798AA4}" type="datetimeFigureOut">
               <a:rPr lang="en-SG" smtClean="0"/>
-              <a:t>12/11/2017</a:t>
+              <a:t>13/11/2017</a:t>
             </a:fld>
             <a:endParaRPr lang="en-SG"/>
           </a:p>
@@ -8326,6 +8326,42 @@
           </a:fontRef>
         </p:style>
       </p:cxnSp>
+      <p:sp>
+        <p:nvSpPr>
+          <p:cNvPr id="126" name="TextBox 125">
+            <a:extLst>
+              <a:ext uri="{FF2B5EF4-FFF2-40B4-BE49-F238E27FC236}">
+                <a16:creationId xmlns:a16="http://schemas.microsoft.com/office/drawing/2014/main" id="{3ABD3846-DF71-49C4-AE22-6CE1C8B39149}"/>
+              </a:ext>
+            </a:extLst>
+          </p:cNvPr>
+          <p:cNvSpPr txBox="1"/>
+          <p:nvPr/>
+        </p:nvSpPr>
+        <p:spPr>
+          <a:xfrm>
+            <a:off x="6102496" y="-20104572"/>
+            <a:ext cx="1972764" cy="369460"/>
+          </a:xfrm>
+          <a:prstGeom prst="rect">
+            <a:avLst/>
+          </a:prstGeom>
+          <a:noFill/>
+        </p:spPr>
+        <p:txBody>
+          <a:bodyPr wrap="square" rtlCol="0">
+            <a:spAutoFit/>
+          </a:bodyPr>
+          <a:lstStyle/>
+          <a:p>
+            <a:r>
+              <a:rPr lang="en-SG" sz="1801" dirty="0" smtClean="0"/>
+              <a:t>remaining</a:t>
+            </a:r>
+            <a:endParaRPr lang="en-SG" sz="1801" dirty="0"/>
+          </a:p>
+        </p:txBody>
+      </p:sp>
     </p:spTree>
     <p:extLst>
       <p:ext uri="{BB962C8B-B14F-4D97-AF65-F5344CB8AC3E}">

</xml_diff>